<commit_message>
model comparison of clinical and full
</commit_message>
<xml_diff>
--- a/cs229poster.pptx
+++ b/cs229poster.pptx
@@ -310,6 +310,11 @@
       </a:defRPr>
     </a:lvl9pPr>
   </p:defaultTextStyle>
+  <p:extLst>
+    <p:ext uri="{EFAFB233-063F-42B5-8137-9DF3F51BA10A}">
+      <p15:sldGuideLst xmlns:p15="http://schemas.microsoft.com/office/powerpoint/2012/main"/>
+    </p:ext>
+  </p:extLst>
 </p:presentation>
 </file>
 
@@ -2672,7 +2677,7 @@
           </a:ln>
           <a:extLst>
             <a:ext uri="{C572A759-6A51-4108-AA02-DFA0A04FC94B}">
-              <ma14:wrappingTextBoxFlag xmlns:ma14="http://schemas.microsoft.com/office/mac/drawingml/2011/main" xmlns:a14="http://schemas.microsoft.com/office/drawing/2010/main" xmlns:m="http://schemas.openxmlformats.org/officeDocument/2006/math" xmlns="" val="1"/>
+              <ma14:wrappingTextBoxFlag xmlns="" xmlns:m="http://schemas.openxmlformats.org/officeDocument/2006/math" xmlns:a14="http://schemas.microsoft.com/office/drawing/2010/main" xmlns:ma14="http://schemas.microsoft.com/office/mac/drawingml/2011/main" val="1"/>
             </a:ext>
           </a:extLst>
         </p:spPr>
@@ -2711,7 +2716,7 @@
           </a:ln>
           <a:extLst>
             <a:ext uri="{C572A759-6A51-4108-AA02-DFA0A04FC94B}">
-              <ma14:wrappingTextBoxFlag xmlns:ma14="http://schemas.microsoft.com/office/mac/drawingml/2011/main" xmlns:a14="http://schemas.microsoft.com/office/drawing/2010/main" xmlns:m="http://schemas.openxmlformats.org/officeDocument/2006/math" xmlns="" val="1"/>
+              <ma14:wrappingTextBoxFlag xmlns="" xmlns:m="http://schemas.openxmlformats.org/officeDocument/2006/math" xmlns:a14="http://schemas.microsoft.com/office/drawing/2010/main" xmlns:ma14="http://schemas.microsoft.com/office/mac/drawingml/2011/main" val="1"/>
             </a:ext>
           </a:extLst>
         </p:spPr>
@@ -3894,7 +3899,7 @@
           </a:ln>
           <a:extLst>
             <a:ext uri="{C572A759-6A51-4108-AA02-DFA0A04FC94B}">
-              <ma14:wrappingTextBoxFlag xmlns:ma14="http://schemas.microsoft.com/office/mac/drawingml/2011/main" xmlns:a14="http://schemas.microsoft.com/office/drawing/2010/main" xmlns:m="http://schemas.openxmlformats.org/officeDocument/2006/math" xmlns="" val="1"/>
+              <ma14:wrappingTextBoxFlag xmlns="" xmlns:m="http://schemas.openxmlformats.org/officeDocument/2006/math" xmlns:a14="http://schemas.microsoft.com/office/drawing/2010/main" xmlns:ma14="http://schemas.microsoft.com/office/mac/drawingml/2011/main" val="1"/>
             </a:ext>
           </a:extLst>
         </p:spPr>
@@ -3945,7 +3950,7 @@
           </a:ln>
           <a:extLst>
             <a:ext uri="{C572A759-6A51-4108-AA02-DFA0A04FC94B}">
-              <ma14:wrappingTextBoxFlag xmlns:ma14="http://schemas.microsoft.com/office/mac/drawingml/2011/main" xmlns:a14="http://schemas.microsoft.com/office/drawing/2010/main" xmlns:m="http://schemas.openxmlformats.org/officeDocument/2006/math" xmlns="" val="1"/>
+              <ma14:wrappingTextBoxFlag xmlns="" xmlns:m="http://schemas.openxmlformats.org/officeDocument/2006/math" xmlns:a14="http://schemas.microsoft.com/office/drawing/2010/main" xmlns:ma14="http://schemas.microsoft.com/office/mac/drawingml/2011/main" val="1"/>
             </a:ext>
           </a:extLst>
         </p:spPr>
@@ -3997,7 +4002,7 @@
           </a:ln>
           <a:extLst>
             <a:ext uri="{C572A759-6A51-4108-AA02-DFA0A04FC94B}">
-              <ma14:wrappingTextBoxFlag xmlns:ma14="http://schemas.microsoft.com/office/mac/drawingml/2011/main" xmlns:a14="http://schemas.microsoft.com/office/drawing/2010/main" xmlns:m="http://schemas.openxmlformats.org/officeDocument/2006/math" xmlns="" val="1"/>
+              <ma14:wrappingTextBoxFlag xmlns="" xmlns:m="http://schemas.openxmlformats.org/officeDocument/2006/math" xmlns:a14="http://schemas.microsoft.com/office/drawing/2010/main" xmlns:ma14="http://schemas.microsoft.com/office/mac/drawingml/2011/main" val="1"/>
             </a:ext>
           </a:extLst>
         </p:spPr>
@@ -4048,7 +4053,7 @@
           </a:ln>
           <a:extLst>
             <a:ext uri="{C572A759-6A51-4108-AA02-DFA0A04FC94B}">
-              <ma14:wrappingTextBoxFlag xmlns:ma14="http://schemas.microsoft.com/office/mac/drawingml/2011/main" xmlns:a14="http://schemas.microsoft.com/office/drawing/2010/main" xmlns:m="http://schemas.openxmlformats.org/officeDocument/2006/math" xmlns="" val="1"/>
+              <ma14:wrappingTextBoxFlag xmlns="" xmlns:m="http://schemas.openxmlformats.org/officeDocument/2006/math" xmlns:a14="http://schemas.microsoft.com/office/drawing/2010/main" xmlns:ma14="http://schemas.microsoft.com/office/mac/drawingml/2011/main" val="1"/>
             </a:ext>
           </a:extLst>
         </p:spPr>
@@ -4100,7 +4105,7 @@
           </a:ln>
           <a:extLst>
             <a:ext uri="{C572A759-6A51-4108-AA02-DFA0A04FC94B}">
-              <ma14:wrappingTextBoxFlag xmlns:ma14="http://schemas.microsoft.com/office/mac/drawingml/2011/main" xmlns:a14="http://schemas.microsoft.com/office/drawing/2010/main" xmlns:m="http://schemas.openxmlformats.org/officeDocument/2006/math" xmlns="" val="1"/>
+              <ma14:wrappingTextBoxFlag xmlns="" xmlns:m="http://schemas.openxmlformats.org/officeDocument/2006/math" xmlns:a14="http://schemas.microsoft.com/office/drawing/2010/main" xmlns:ma14="http://schemas.microsoft.com/office/mac/drawingml/2011/main" val="1"/>
             </a:ext>
           </a:extLst>
         </p:spPr>
@@ -4147,7 +4152,7 @@
           </a:ln>
           <a:extLst>
             <a:ext uri="{C572A759-6A51-4108-AA02-DFA0A04FC94B}">
-              <ma14:wrappingTextBoxFlag xmlns:ma14="http://schemas.microsoft.com/office/mac/drawingml/2011/main" xmlns:a14="http://schemas.microsoft.com/office/drawing/2010/main" xmlns:m="http://schemas.openxmlformats.org/officeDocument/2006/math" xmlns="" val="1"/>
+              <ma14:wrappingTextBoxFlag xmlns="" xmlns:m="http://schemas.openxmlformats.org/officeDocument/2006/math" xmlns:a14="http://schemas.microsoft.com/office/drawing/2010/main" xmlns:ma14="http://schemas.microsoft.com/office/mac/drawingml/2011/main" val="1"/>
             </a:ext>
           </a:extLst>
         </p:spPr>
@@ -4358,7 +4363,7 @@
           </a:ln>
           <a:extLst>
             <a:ext uri="{C572A759-6A51-4108-AA02-DFA0A04FC94B}">
-              <ma14:wrappingTextBoxFlag xmlns:ma14="http://schemas.microsoft.com/office/mac/drawingml/2011/main" xmlns:a14="http://schemas.microsoft.com/office/drawing/2010/main" xmlns:m="http://schemas.openxmlformats.org/officeDocument/2006/math" xmlns="" val="1"/>
+              <ma14:wrappingTextBoxFlag xmlns="" xmlns:m="http://schemas.openxmlformats.org/officeDocument/2006/math" xmlns:a14="http://schemas.microsoft.com/office/drawing/2010/main" xmlns:ma14="http://schemas.microsoft.com/office/mac/drawingml/2011/main" val="1"/>
             </a:ext>
           </a:extLst>
         </p:spPr>
@@ -4404,7 +4409,7 @@
           </a:ln>
           <a:extLst>
             <a:ext uri="{C572A759-6A51-4108-AA02-DFA0A04FC94B}">
-              <ma14:wrappingTextBoxFlag xmlns:ma14="http://schemas.microsoft.com/office/mac/drawingml/2011/main" xmlns:a14="http://schemas.microsoft.com/office/drawing/2010/main" xmlns:m="http://schemas.openxmlformats.org/officeDocument/2006/math" xmlns="" val="1"/>
+              <ma14:wrappingTextBoxFlag xmlns="" xmlns:m="http://schemas.openxmlformats.org/officeDocument/2006/math" xmlns:a14="http://schemas.microsoft.com/office/drawing/2010/main" xmlns:ma14="http://schemas.microsoft.com/office/mac/drawingml/2011/main" val="1"/>
             </a:ext>
           </a:extLst>
         </p:spPr>
@@ -4514,7 +4519,7 @@
           </a:ln>
           <a:extLst>
             <a:ext uri="{C572A759-6A51-4108-AA02-DFA0A04FC94B}">
-              <ma14:wrappingTextBoxFlag xmlns:ma14="http://schemas.microsoft.com/office/mac/drawingml/2011/main" xmlns:a14="http://schemas.microsoft.com/office/drawing/2010/main" xmlns:m="http://schemas.openxmlformats.org/officeDocument/2006/math" xmlns="" val="1"/>
+              <ma14:wrappingTextBoxFlag xmlns="" xmlns:m="http://schemas.openxmlformats.org/officeDocument/2006/math" xmlns:a14="http://schemas.microsoft.com/office/drawing/2010/main" xmlns:ma14="http://schemas.microsoft.com/office/mac/drawingml/2011/main" val="1"/>
             </a:ext>
           </a:extLst>
         </p:spPr>
@@ -4563,7 +4568,7 @@
           </a:ln>
           <a:extLst>
             <a:ext uri="{C572A759-6A51-4108-AA02-DFA0A04FC94B}">
-              <ma14:wrappingTextBoxFlag xmlns:ma14="http://schemas.microsoft.com/office/mac/drawingml/2011/main" xmlns:a14="http://schemas.microsoft.com/office/drawing/2010/main" xmlns:m="http://schemas.openxmlformats.org/officeDocument/2006/math" xmlns="" val="1"/>
+              <ma14:wrappingTextBoxFlag xmlns="" xmlns:m="http://schemas.openxmlformats.org/officeDocument/2006/math" xmlns:a14="http://schemas.microsoft.com/office/drawing/2010/main" xmlns:ma14="http://schemas.microsoft.com/office/mac/drawingml/2011/main" val="1"/>
             </a:ext>
           </a:extLst>
         </p:spPr>
@@ -4612,7 +4617,7 @@
           </a:ln>
           <a:extLst>
             <a:ext uri="{C572A759-6A51-4108-AA02-DFA0A04FC94B}">
-              <ma14:wrappingTextBoxFlag xmlns:ma14="http://schemas.microsoft.com/office/mac/drawingml/2011/main" xmlns:a14="http://schemas.microsoft.com/office/drawing/2010/main" xmlns:m="http://schemas.openxmlformats.org/officeDocument/2006/math" xmlns="" val="1"/>
+              <ma14:wrappingTextBoxFlag xmlns="" xmlns:m="http://schemas.openxmlformats.org/officeDocument/2006/math" xmlns:a14="http://schemas.microsoft.com/office/drawing/2010/main" xmlns:ma14="http://schemas.microsoft.com/office/mac/drawingml/2011/main" val="1"/>
             </a:ext>
           </a:extLst>
         </p:spPr>
@@ -4632,7 +4637,7 @@
             </a:pPr>
             <a:r>
               <a:rPr lang="en-US" dirty="0"/>
-              <a:t>Model 1 – e.g. Random Forest Classifier</a:t>
+              <a:t>Model 1 – Logistic Regression</a:t>
             </a:r>
             <a:endParaRPr dirty="0"/>
           </a:p>
@@ -4674,7 +4679,7 @@
           </a:ln>
           <a:extLst>
             <a:ext uri="{C572A759-6A51-4108-AA02-DFA0A04FC94B}">
-              <ma14:wrappingTextBoxFlag xmlns:ma14="http://schemas.microsoft.com/office/mac/drawingml/2011/main" xmlns:a14="http://schemas.microsoft.com/office/drawing/2010/main" xmlns:m="http://schemas.openxmlformats.org/officeDocument/2006/math" xmlns="" val="1"/>
+              <ma14:wrappingTextBoxFlag xmlns="" xmlns:m="http://schemas.openxmlformats.org/officeDocument/2006/math" xmlns:a14="http://schemas.microsoft.com/office/drawing/2010/main" xmlns:ma14="http://schemas.microsoft.com/office/mac/drawingml/2011/main" val="1"/>
             </a:ext>
           </a:extLst>
         </p:spPr>
@@ -4855,7 +4860,7 @@
           </a:ln>
           <a:extLst>
             <a:ext uri="{C572A759-6A51-4108-AA02-DFA0A04FC94B}">
-              <ma14:wrappingTextBoxFlag xmlns:ma14="http://schemas.microsoft.com/office/mac/drawingml/2011/main" xmlns:a14="http://schemas.microsoft.com/office/drawing/2010/main" xmlns:m="http://schemas.openxmlformats.org/officeDocument/2006/math" xmlns="" val="1"/>
+              <ma14:wrappingTextBoxFlag xmlns="" xmlns:m="http://schemas.openxmlformats.org/officeDocument/2006/math" xmlns:a14="http://schemas.microsoft.com/office/drawing/2010/main" xmlns:ma14="http://schemas.microsoft.com/office/mac/drawingml/2011/main" val="1"/>
             </a:ext>
           </a:extLst>
         </p:spPr>
@@ -4913,7 +4918,7 @@
           </a:ln>
           <a:extLst>
             <a:ext uri="{C572A759-6A51-4108-AA02-DFA0A04FC94B}">
-              <ma14:wrappingTextBoxFlag xmlns:ma14="http://schemas.microsoft.com/office/mac/drawingml/2011/main" xmlns:a14="http://schemas.microsoft.com/office/drawing/2010/main" xmlns:m="http://schemas.openxmlformats.org/officeDocument/2006/math" xmlns="" val="1"/>
+              <ma14:wrappingTextBoxFlag xmlns="" xmlns:m="http://schemas.openxmlformats.org/officeDocument/2006/math" xmlns:a14="http://schemas.microsoft.com/office/drawing/2010/main" xmlns:ma14="http://schemas.microsoft.com/office/mac/drawingml/2011/main" val="1"/>
             </a:ext>
           </a:extLst>
         </p:spPr>
@@ -4966,7 +4971,7 @@
           </a:ln>
           <a:extLst>
             <a:ext uri="{C572A759-6A51-4108-AA02-DFA0A04FC94B}">
-              <ma14:wrappingTextBoxFlag xmlns:ma14="http://schemas.microsoft.com/office/mac/drawingml/2011/main" xmlns:a14="http://schemas.microsoft.com/office/drawing/2010/main" xmlns:m="http://schemas.openxmlformats.org/officeDocument/2006/math" xmlns="" val="1"/>
+              <ma14:wrappingTextBoxFlag xmlns="" xmlns:m="http://schemas.openxmlformats.org/officeDocument/2006/math" xmlns:a14="http://schemas.microsoft.com/office/drawing/2010/main" xmlns:ma14="http://schemas.microsoft.com/office/mac/drawingml/2011/main" val="1"/>
             </a:ext>
           </a:extLst>
         </p:spPr>
@@ -5049,7 +5054,7 @@
           </a:ln>
           <a:extLst>
             <a:ext uri="{C572A759-6A51-4108-AA02-DFA0A04FC94B}">
-              <ma14:wrappingTextBoxFlag xmlns:ma14="http://schemas.microsoft.com/office/mac/drawingml/2011/main" xmlns:a14="http://schemas.microsoft.com/office/drawing/2010/main" xmlns:m="http://schemas.openxmlformats.org/officeDocument/2006/math" xmlns="" val="1"/>
+              <ma14:wrappingTextBoxFlag xmlns="" xmlns:m="http://schemas.openxmlformats.org/officeDocument/2006/math" xmlns:a14="http://schemas.microsoft.com/office/drawing/2010/main" xmlns:ma14="http://schemas.microsoft.com/office/mac/drawingml/2011/main" val="1"/>
             </a:ext>
           </a:extLst>
         </p:spPr>
@@ -5190,74 +5195,6 @@
                 <a:sym typeface="Roboto Thin"/>
               </a:defRPr>
             </a:pPr>
-            <a:endParaRPr dirty="0"/>
-          </a:p>
-        </p:txBody>
-      </p:sp>
-      <p:sp>
-        <p:nvSpPr>
-          <p:cNvPr id="343" name="Rectangle 116">
-            <a:extLst>
-              <a:ext uri="{FF2B5EF4-FFF2-40B4-BE49-F238E27FC236}">
-                <a16:creationId xmlns:a16="http://schemas.microsoft.com/office/drawing/2014/main" id="{7B298209-419F-424D-A20F-C2971D594066}"/>
-              </a:ext>
-            </a:extLst>
-          </p:cNvPr>
-          <p:cNvSpPr txBox="1"/>
-          <p:nvPr/>
-        </p:nvSpPr>
-        <p:spPr>
-          <a:xfrm>
-            <a:off x="13462000" y="19312145"/>
-            <a:ext cx="10831842" cy="1107996"/>
-          </a:xfrm>
-          <a:prstGeom prst="rect">
-            <a:avLst/>
-          </a:prstGeom>
-          <a:ln w="3175">
-            <a:miter lim="400000"/>
-          </a:ln>
-          <a:extLst>
-            <a:ext uri="{C572A759-6A51-4108-AA02-DFA0A04FC94B}">
-              <ma14:wrappingTextBoxFlag xmlns:ma14="http://schemas.microsoft.com/office/mac/drawingml/2011/main" xmlns:a14="http://schemas.microsoft.com/office/drawing/2010/main" xmlns:m="http://schemas.openxmlformats.org/officeDocument/2006/math" xmlns="" val="1"/>
-            </a:ext>
-          </a:extLst>
-        </p:spPr>
-        <p:txBody>
-          <a:bodyPr lIns="45719" rIns="45719" anchor="ctr">
-            <a:spAutoFit/>
-          </a:bodyPr>
-          <a:lstStyle/>
-          <a:p>
-            <a:pPr defTabSz="3511296">
-              <a:defRPr sz="3600" u="sng">
-                <a:latin typeface="Roboto Regular"/>
-                <a:ea typeface="Roboto Regular"/>
-                <a:cs typeface="Roboto Regular"/>
-                <a:sym typeface="Roboto Regular"/>
-              </a:defRPr>
-            </a:pPr>
-            <a:r>
-              <a:rPr lang="en-US" dirty="0"/>
-              <a:t>Model 2 – e.g. Random Forest Classifier</a:t>
-            </a:r>
-            <a:endParaRPr dirty="0"/>
-          </a:p>
-          <a:p>
-            <a:pPr marL="360947" indent="-360947" defTabSz="3511296">
-              <a:buSzPct val="100000"/>
-              <a:buChar char="•"/>
-              <a:defRPr sz="3000">
-                <a:latin typeface="Roboto Thin"/>
-                <a:ea typeface="Roboto Thin"/>
-                <a:cs typeface="Roboto Thin"/>
-                <a:sym typeface="Roboto Thin"/>
-              </a:defRPr>
-            </a:pPr>
-            <a:r>
-              <a:rPr lang="en-US" dirty="0"/>
-              <a:t>Motivation and performance for each</a:t>
-            </a:r>
             <a:endParaRPr dirty="0"/>
           </a:p>
         </p:txBody>
@@ -5287,7 +5224,7 @@
           </a:ln>
           <a:extLst>
             <a:ext uri="{C572A759-6A51-4108-AA02-DFA0A04FC94B}">
-              <ma14:wrappingTextBoxFlag xmlns:ma14="http://schemas.microsoft.com/office/mac/drawingml/2011/main" xmlns:a14="http://schemas.microsoft.com/office/drawing/2010/main" xmlns:m="http://schemas.openxmlformats.org/officeDocument/2006/math" xmlns="" val="1"/>
+              <ma14:wrappingTextBoxFlag xmlns="" xmlns:m="http://schemas.openxmlformats.org/officeDocument/2006/math" xmlns:a14="http://schemas.microsoft.com/office/drawing/2010/main" xmlns:ma14="http://schemas.microsoft.com/office/mac/drawingml/2011/main" val="1"/>
             </a:ext>
           </a:extLst>
         </p:spPr>
@@ -5307,7 +5244,7 @@
             </a:pPr>
             <a:r>
               <a:rPr lang="en-US" dirty="0"/>
-              <a:t>Model 3 – e.g. Random Forest Classifier</a:t>
+              <a:t>Model 3 – Random Forest Classifier</a:t>
             </a:r>
             <a:endParaRPr dirty="0"/>
           </a:p>
@@ -5355,7 +5292,7 @@
           </a:ln>
           <a:extLst>
             <a:ext uri="{C572A759-6A51-4108-AA02-DFA0A04FC94B}">
-              <ma14:wrappingTextBoxFlag xmlns:ma14="http://schemas.microsoft.com/office/mac/drawingml/2011/main" xmlns:a14="http://schemas.microsoft.com/office/drawing/2010/main" xmlns:m="http://schemas.openxmlformats.org/officeDocument/2006/math" xmlns="" val="1"/>
+              <ma14:wrappingTextBoxFlag xmlns="" xmlns:m="http://schemas.openxmlformats.org/officeDocument/2006/math" xmlns:a14="http://schemas.microsoft.com/office/drawing/2010/main" xmlns:ma14="http://schemas.microsoft.com/office/mac/drawingml/2011/main" val="1"/>
             </a:ext>
           </a:extLst>
         </p:spPr>
@@ -5422,7 +5359,7 @@
           </a:ln>
           <a:extLst>
             <a:ext uri="{C572A759-6A51-4108-AA02-DFA0A04FC94B}">
-              <ma14:wrappingTextBoxFlag xmlns:ma14="http://schemas.microsoft.com/office/mac/drawingml/2011/main" xmlns:a14="http://schemas.microsoft.com/office/drawing/2010/main" xmlns:m="http://schemas.openxmlformats.org/officeDocument/2006/math" xmlns="" val="1"/>
+              <ma14:wrappingTextBoxFlag xmlns="" xmlns:m="http://schemas.openxmlformats.org/officeDocument/2006/math" xmlns:a14="http://schemas.microsoft.com/office/drawing/2010/main" xmlns:ma14="http://schemas.microsoft.com/office/mac/drawingml/2011/main" val="1"/>
             </a:ext>
           </a:extLst>
         </p:spPr>
@@ -5489,7 +5426,7 @@
           </a:ln>
           <a:extLst>
             <a:ext uri="{C572A759-6A51-4108-AA02-DFA0A04FC94B}">
-              <ma14:wrappingTextBoxFlag xmlns:ma14="http://schemas.microsoft.com/office/mac/drawingml/2011/main" xmlns:a14="http://schemas.microsoft.com/office/drawing/2010/main" xmlns:m="http://schemas.openxmlformats.org/officeDocument/2006/math" xmlns="" val="1"/>
+              <ma14:wrappingTextBoxFlag xmlns="" xmlns:m="http://schemas.openxmlformats.org/officeDocument/2006/math" xmlns:a14="http://schemas.microsoft.com/office/drawing/2010/main" xmlns:ma14="http://schemas.microsoft.com/office/mac/drawingml/2011/main" val="1"/>
             </a:ext>
           </a:extLst>
         </p:spPr>
@@ -5556,7 +5493,7 @@
           </a:ln>
           <a:extLst>
             <a:ext uri="{C572A759-6A51-4108-AA02-DFA0A04FC94B}">
-              <ma14:wrappingTextBoxFlag xmlns:ma14="http://schemas.microsoft.com/office/mac/drawingml/2011/main" xmlns:a14="http://schemas.microsoft.com/office/drawing/2010/main" xmlns:m="http://schemas.openxmlformats.org/officeDocument/2006/math" xmlns="" val="1"/>
+              <ma14:wrappingTextBoxFlag xmlns="" xmlns:m="http://schemas.openxmlformats.org/officeDocument/2006/math" xmlns:a14="http://schemas.microsoft.com/office/drawing/2010/main" xmlns:ma14="http://schemas.microsoft.com/office/mac/drawingml/2011/main" val="1"/>
             </a:ext>
           </a:extLst>
         </p:spPr>
@@ -5730,6 +5667,74 @@
               </a:rPr>
               <a:t>/djw327</a:t>
             </a:r>
+          </a:p>
+        </p:txBody>
+      </p:sp>
+      <p:sp>
+        <p:nvSpPr>
+          <p:cNvPr id="32" name="Rectangle 116">
+            <a:extLst>
+              <a:ext uri="{FF2B5EF4-FFF2-40B4-BE49-F238E27FC236}">
+                <a16:creationId xmlns:a16="http://schemas.microsoft.com/office/drawing/2014/main" id="{A4B05AF9-A882-B74D-98D2-F13906061118}"/>
+              </a:ext>
+            </a:extLst>
+          </p:cNvPr>
+          <p:cNvSpPr txBox="1"/>
+          <p:nvPr/>
+        </p:nvSpPr>
+        <p:spPr>
+          <a:xfrm>
+            <a:off x="13462000" y="19431895"/>
+            <a:ext cx="10831842" cy="1107996"/>
+          </a:xfrm>
+          <a:prstGeom prst="rect">
+            <a:avLst/>
+          </a:prstGeom>
+          <a:ln w="3175">
+            <a:miter lim="400000"/>
+          </a:ln>
+          <a:extLst>
+            <a:ext uri="{C572A759-6A51-4108-AA02-DFA0A04FC94B}">
+              <ma14:wrappingTextBoxFlag xmlns="" xmlns:m="http://schemas.openxmlformats.org/officeDocument/2006/math" xmlns:a14="http://schemas.microsoft.com/office/drawing/2010/main" xmlns:ma14="http://schemas.microsoft.com/office/mac/drawingml/2011/main" val="1"/>
+            </a:ext>
+          </a:extLst>
+        </p:spPr>
+        <p:txBody>
+          <a:bodyPr lIns="45719" rIns="45719" anchor="ctr">
+            <a:spAutoFit/>
+          </a:bodyPr>
+          <a:lstStyle/>
+          <a:p>
+            <a:pPr defTabSz="3511296">
+              <a:defRPr sz="3600" u="sng">
+                <a:latin typeface="Roboto Regular"/>
+                <a:ea typeface="Roboto Regular"/>
+                <a:cs typeface="Roboto Regular"/>
+                <a:sym typeface="Roboto Regular"/>
+              </a:defRPr>
+            </a:pPr>
+            <a:r>
+              <a:rPr lang="en-US" dirty="0"/>
+              <a:t>Model 2 – SVM w/ Gaussian Kernel</a:t>
+            </a:r>
+            <a:endParaRPr dirty="0"/>
+          </a:p>
+          <a:p>
+            <a:pPr marL="360947" indent="-360947" defTabSz="3511296">
+              <a:buSzPct val="100000"/>
+              <a:buChar char="•"/>
+              <a:defRPr sz="3000">
+                <a:latin typeface="Roboto Thin"/>
+                <a:ea typeface="Roboto Thin"/>
+                <a:cs typeface="Roboto Thin"/>
+                <a:sym typeface="Roboto Thin"/>
+              </a:defRPr>
+            </a:pPr>
+            <a:r>
+              <a:rPr lang="en-US" dirty="0"/>
+              <a:t>Motivation and performance for each</a:t>
+            </a:r>
+            <a:endParaRPr dirty="0"/>
           </a:p>
         </p:txBody>
       </p:sp>

</xml_diff>

<commit_message>
slight poster updates, pulling before I do gene lookup
</commit_message>
<xml_diff>
--- a/cs229poster.pptx
+++ b/cs229poster.pptx
@@ -310,6 +310,11 @@
       </a:defRPr>
     </a:lvl9pPr>
   </p:defaultTextStyle>
+  <p:extLst>
+    <p:ext uri="{EFAFB233-063F-42B5-8137-9DF3F51BA10A}">
+      <p15:sldGuideLst xmlns:p15="http://schemas.microsoft.com/office/powerpoint/2012/main"/>
+    </p:ext>
+  </p:extLst>
 </p:presentation>
 </file>
 
@@ -3864,7 +3869,28 @@
           <a:p>
             <a:r>
               <a:rPr lang="en-US" dirty="0"/>
-              <a:t>Sean Friedowitz (sfriedo), Kevin J Hou (kjhou)</a:t>
+              <a:t>Sean Friedowitz (</a:t>
+            </a:r>
+            <a:r>
+              <a:rPr lang="en-US" dirty="0">
+                <a:latin typeface="Courier" pitchFamily="2" charset="0"/>
+                <a:cs typeface="Calibri" panose="020F0502020204030204" pitchFamily="34" charset="0"/>
+              </a:rPr>
+              <a:t>sfriedo</a:t>
+            </a:r>
+            <a:r>
+              <a:rPr lang="en-US" dirty="0"/>
+              <a:t>), Kevin J Hou (</a:t>
+            </a:r>
+            <a:r>
+              <a:rPr lang="en-US" dirty="0">
+                <a:latin typeface="Courier" pitchFamily="2" charset="0"/>
+              </a:rPr>
+              <a:t>kjhou</a:t>
+            </a:r>
+            <a:r>
+              <a:rPr lang="en-US" dirty="0"/>
+              <a:t>)</a:t>
             </a:r>
             <a:endParaRPr dirty="0"/>
           </a:p>
@@ -4347,8 +4373,8 @@
         </p:nvSpPr>
         <p:spPr>
           <a:xfrm>
-            <a:off x="26640272" y="7111509"/>
-            <a:ext cx="9711456" cy="646331"/>
+            <a:off x="26640272" y="7166681"/>
+            <a:ext cx="5019567" cy="646331"/>
           </a:xfrm>
           <a:prstGeom prst="rect">
             <a:avLst/>
@@ -4363,7 +4389,7 @@
           </a:extLst>
         </p:spPr>
         <p:txBody>
-          <a:bodyPr lIns="45719" rIns="45719" anchor="ctr">
+          <a:bodyPr wrap="square" lIns="45719" rIns="45719" anchor="ctr">
             <a:spAutoFit/>
           </a:bodyPr>
           <a:lstStyle>
@@ -4470,7 +4496,7 @@
         </p:nvSpPr>
         <p:spPr>
           <a:xfrm>
-            <a:off x="7088387" y="13074921"/>
+            <a:off x="19526249" y="4312450"/>
             <a:ext cx="5080001" cy="4749301"/>
           </a:xfrm>
           <a:prstGeom prst="rect">
@@ -4491,7 +4517,7 @@
           <a:bodyPr lIns="35277" tIns="35277" rIns="35277" bIns="35277" anchor="ctr"/>
           <a:lstStyle/>
           <a:p>
-            <a:endParaRPr/>
+            <a:endParaRPr lang="en-US" dirty="0"/>
           </a:p>
         </p:txBody>
       </p:sp>
@@ -4552,7 +4578,7 @@
         </p:nvSpPr>
         <p:spPr>
           <a:xfrm>
-            <a:off x="7274725" y="13292189"/>
+            <a:off x="19822725" y="4584291"/>
             <a:ext cx="4783525" cy="646331"/>
           </a:xfrm>
           <a:prstGeom prst="rect">
@@ -4587,7 +4613,7 @@
             </a:pPr>
             <a:r>
               <a:rPr lang="en-US" u="sng" dirty="0"/>
-              <a:t>Clinical Features?:</a:t>
+              <a:t>Top Genes:</a:t>
             </a:r>
             <a:endParaRPr u="sng" dirty="0"/>
           </a:p>
@@ -4663,7 +4689,7 @@
         </p:nvSpPr>
         <p:spPr>
           <a:xfrm>
-            <a:off x="7274725" y="14071589"/>
+            <a:off x="19822725" y="5363691"/>
             <a:ext cx="4707325" cy="3200876"/>
           </a:xfrm>
           <a:prstGeom prst="rect">

</xml_diff>

<commit_message>
added best featuers to the poster
</commit_message>
<xml_diff>
--- a/cs229poster.pptx
+++ b/cs229poster.pptx
@@ -2677,7 +2677,7 @@
           </a:ln>
           <a:extLst>
             <a:ext uri="{C572A759-6A51-4108-AA02-DFA0A04FC94B}">
-              <ma14:wrappingTextBoxFlag xmlns="" xmlns:m="http://schemas.openxmlformats.org/officeDocument/2006/math" xmlns:a14="http://schemas.microsoft.com/office/drawing/2010/main" xmlns:ma14="http://schemas.microsoft.com/office/mac/drawingml/2011/main" val="1"/>
+              <ma14:wrappingTextBoxFlag xmlns:ma14="http://schemas.microsoft.com/office/mac/drawingml/2011/main" xmlns:a14="http://schemas.microsoft.com/office/drawing/2010/main" xmlns:m="http://schemas.openxmlformats.org/officeDocument/2006/math" xmlns="" val="1"/>
             </a:ext>
           </a:extLst>
         </p:spPr>
@@ -2716,7 +2716,7 @@
           </a:ln>
           <a:extLst>
             <a:ext uri="{C572A759-6A51-4108-AA02-DFA0A04FC94B}">
-              <ma14:wrappingTextBoxFlag xmlns="" xmlns:m="http://schemas.openxmlformats.org/officeDocument/2006/math" xmlns:a14="http://schemas.microsoft.com/office/drawing/2010/main" xmlns:ma14="http://schemas.microsoft.com/office/mac/drawingml/2011/main" val="1"/>
+              <ma14:wrappingTextBoxFlag xmlns:ma14="http://schemas.microsoft.com/office/mac/drawingml/2011/main" xmlns:a14="http://schemas.microsoft.com/office/drawing/2010/main" xmlns:m="http://schemas.openxmlformats.org/officeDocument/2006/math" xmlns="" val="1"/>
             </a:ext>
           </a:extLst>
         </p:spPr>
@@ -3920,7 +3920,7 @@
           </a:ln>
           <a:extLst>
             <a:ext uri="{C572A759-6A51-4108-AA02-DFA0A04FC94B}">
-              <ma14:wrappingTextBoxFlag xmlns="" xmlns:m="http://schemas.openxmlformats.org/officeDocument/2006/math" xmlns:a14="http://schemas.microsoft.com/office/drawing/2010/main" xmlns:ma14="http://schemas.microsoft.com/office/mac/drawingml/2011/main" val="1"/>
+              <ma14:wrappingTextBoxFlag xmlns:ma14="http://schemas.microsoft.com/office/mac/drawingml/2011/main" xmlns:a14="http://schemas.microsoft.com/office/drawing/2010/main" xmlns:m="http://schemas.openxmlformats.org/officeDocument/2006/math" xmlns="" val="1"/>
             </a:ext>
           </a:extLst>
         </p:spPr>
@@ -3976,7 +3976,7 @@
           </a:ln>
           <a:extLst>
             <a:ext uri="{C572A759-6A51-4108-AA02-DFA0A04FC94B}">
-              <ma14:wrappingTextBoxFlag xmlns="" xmlns:m="http://schemas.openxmlformats.org/officeDocument/2006/math" xmlns:a14="http://schemas.microsoft.com/office/drawing/2010/main" xmlns:ma14="http://schemas.microsoft.com/office/mac/drawingml/2011/main" val="1"/>
+              <ma14:wrappingTextBoxFlag xmlns:ma14="http://schemas.microsoft.com/office/mac/drawingml/2011/main" xmlns:a14="http://schemas.microsoft.com/office/drawing/2010/main" xmlns:m="http://schemas.openxmlformats.org/officeDocument/2006/math" xmlns="" val="1"/>
             </a:ext>
           </a:extLst>
         </p:spPr>
@@ -4028,7 +4028,7 @@
           </a:ln>
           <a:extLst>
             <a:ext uri="{C572A759-6A51-4108-AA02-DFA0A04FC94B}">
-              <ma14:wrappingTextBoxFlag xmlns="" xmlns:m="http://schemas.openxmlformats.org/officeDocument/2006/math" xmlns:a14="http://schemas.microsoft.com/office/drawing/2010/main" xmlns:ma14="http://schemas.microsoft.com/office/mac/drawingml/2011/main" val="1"/>
+              <ma14:wrappingTextBoxFlag xmlns:ma14="http://schemas.microsoft.com/office/mac/drawingml/2011/main" xmlns:a14="http://schemas.microsoft.com/office/drawing/2010/main" xmlns:m="http://schemas.openxmlformats.org/officeDocument/2006/math" xmlns="" val="1"/>
             </a:ext>
           </a:extLst>
         </p:spPr>
@@ -4079,7 +4079,7 @@
           </a:ln>
           <a:extLst>
             <a:ext uri="{C572A759-6A51-4108-AA02-DFA0A04FC94B}">
-              <ma14:wrappingTextBoxFlag xmlns="" xmlns:m="http://schemas.openxmlformats.org/officeDocument/2006/math" xmlns:a14="http://schemas.microsoft.com/office/drawing/2010/main" xmlns:ma14="http://schemas.microsoft.com/office/mac/drawingml/2011/main" val="1"/>
+              <ma14:wrappingTextBoxFlag xmlns:ma14="http://schemas.microsoft.com/office/mac/drawingml/2011/main" xmlns:a14="http://schemas.microsoft.com/office/drawing/2010/main" xmlns:m="http://schemas.openxmlformats.org/officeDocument/2006/math" xmlns="" val="1"/>
             </a:ext>
           </a:extLst>
         </p:spPr>
@@ -4131,7 +4131,7 @@
           </a:ln>
           <a:extLst>
             <a:ext uri="{C572A759-6A51-4108-AA02-DFA0A04FC94B}">
-              <ma14:wrappingTextBoxFlag xmlns="" xmlns:m="http://schemas.openxmlformats.org/officeDocument/2006/math" xmlns:a14="http://schemas.microsoft.com/office/drawing/2010/main" xmlns:ma14="http://schemas.microsoft.com/office/mac/drawingml/2011/main" val="1"/>
+              <ma14:wrappingTextBoxFlag xmlns:ma14="http://schemas.microsoft.com/office/mac/drawingml/2011/main" xmlns:a14="http://schemas.microsoft.com/office/drawing/2010/main" xmlns:m="http://schemas.openxmlformats.org/officeDocument/2006/math" xmlns="" val="1"/>
             </a:ext>
           </a:extLst>
         </p:spPr>
@@ -4178,7 +4178,7 @@
           </a:ln>
           <a:extLst>
             <a:ext uri="{C572A759-6A51-4108-AA02-DFA0A04FC94B}">
-              <ma14:wrappingTextBoxFlag xmlns="" xmlns:m="http://schemas.openxmlformats.org/officeDocument/2006/math" xmlns:a14="http://schemas.microsoft.com/office/drawing/2010/main" xmlns:ma14="http://schemas.microsoft.com/office/mac/drawingml/2011/main" val="1"/>
+              <ma14:wrappingTextBoxFlag xmlns:ma14="http://schemas.microsoft.com/office/mac/drawingml/2011/main" xmlns:a14="http://schemas.microsoft.com/office/drawing/2010/main" xmlns:m="http://schemas.openxmlformats.org/officeDocument/2006/math" xmlns="" val="1"/>
             </a:ext>
           </a:extLst>
         </p:spPr>
@@ -4452,7 +4452,7 @@
           </a:ln>
           <a:extLst>
             <a:ext uri="{C572A759-6A51-4108-AA02-DFA0A04FC94B}">
-              <ma14:wrappingTextBoxFlag xmlns="" xmlns:m="http://schemas.openxmlformats.org/officeDocument/2006/math" xmlns:a14="http://schemas.microsoft.com/office/drawing/2010/main" xmlns:ma14="http://schemas.microsoft.com/office/mac/drawingml/2011/main" val="1"/>
+              <ma14:wrappingTextBoxFlag xmlns:ma14="http://schemas.microsoft.com/office/mac/drawingml/2011/main" xmlns:a14="http://schemas.microsoft.com/office/drawing/2010/main" xmlns:m="http://schemas.openxmlformats.org/officeDocument/2006/math" xmlns="" val="1"/>
             </a:ext>
           </a:extLst>
         </p:spPr>
@@ -4487,8 +4487,8 @@
         </p:nvSpPr>
         <p:spPr>
           <a:xfrm>
-            <a:off x="19240500" y="8788219"/>
-            <a:ext cx="5212177" cy="4339650"/>
+            <a:off x="13561816" y="8848293"/>
+            <a:ext cx="10886101" cy="2492990"/>
           </a:xfrm>
           <a:prstGeom prst="rect">
             <a:avLst/>
@@ -4498,7 +4498,7 @@
           </a:ln>
           <a:extLst>
             <a:ext uri="{C572A759-6A51-4108-AA02-DFA0A04FC94B}">
-              <ma14:wrappingTextBoxFlag xmlns="" xmlns:m="http://schemas.openxmlformats.org/officeDocument/2006/math" xmlns:a14="http://schemas.microsoft.com/office/drawing/2010/main" xmlns:ma14="http://schemas.microsoft.com/office/mac/drawingml/2011/main" val="1"/>
+              <ma14:wrappingTextBoxFlag xmlns:ma14="http://schemas.microsoft.com/office/mac/drawingml/2011/main" xmlns:a14="http://schemas.microsoft.com/office/drawing/2010/main" xmlns:m="http://schemas.openxmlformats.org/officeDocument/2006/math" xmlns="" val="1"/>
             </a:ext>
           </a:extLst>
         </p:spPr>
@@ -4518,7 +4518,7 @@
             </a:pPr>
             <a:r>
               <a:rPr lang="en-US" u="sng" dirty="0"/>
-              <a:t>Best Features</a:t>
+              <a:t>Our Best Predictor: 53 Features (genes)</a:t>
             </a:r>
             <a:endParaRPr u="sng" dirty="0"/>
           </a:p>
@@ -4535,7 +4535,7 @@
             </a:pPr>
             <a:r>
               <a:rPr lang="en-US" dirty="0"/>
-              <a:t>No overlap with gene marker from original study</a:t>
+              <a:t>No overlap with the predicter produced by AEGIS study!</a:t>
             </a:r>
           </a:p>
           <a:p>
@@ -4551,7 +4551,7 @@
             </a:pPr>
             <a:r>
               <a:rPr lang="en-US" dirty="0"/>
-              <a:t>Many linkages to other types of cancer</a:t>
+              <a:t>Genes encode proteins which regulate cell proliferation, transcription factors, and non-coding RNA (ncRNA).</a:t>
             </a:r>
           </a:p>
           <a:p>
@@ -4567,41 +4567,8 @@
             </a:pPr>
             <a:r>
               <a:rPr lang="en-US" dirty="0"/>
-              <a:t>Many transcription factors and other proteins responsible for cell proliferation</a:t>
-            </a:r>
-          </a:p>
-        </p:txBody>
-      </p:sp>
-      <p:sp>
-        <p:nvSpPr>
-          <p:cNvPr id="249" name="Rectangle"/>
-          <p:cNvSpPr/>
-          <p:nvPr/>
-        </p:nvSpPr>
-        <p:spPr>
-          <a:xfrm>
-            <a:off x="13589367" y="8962966"/>
-            <a:ext cx="5080001" cy="4115558"/>
-          </a:xfrm>
-          <a:prstGeom prst="rect">
-            <a:avLst/>
-          </a:prstGeom>
-          <a:solidFill>
-            <a:srgbClr val="FFFFFF"/>
-          </a:solidFill>
-          <a:ln w="50800">
-            <a:solidFill>
-              <a:schemeClr val="accent1">
-                <a:lumOff val="-10784"/>
-              </a:schemeClr>
-            </a:solidFill>
-          </a:ln>
-        </p:spPr>
-        <p:txBody>
-          <a:bodyPr lIns="35277" tIns="35277" rIns="35277" bIns="35277" anchor="ctr"/>
-          <a:lstStyle/>
-          <a:p>
-            <a:endParaRPr lang="en-US" dirty="0"/>
+              <a:t>Some features have been previously linked to cancer:</a:t>
+            </a:r>
           </a:p>
         </p:txBody>
       </p:sp>
@@ -4624,7 +4591,7 @@
           </a:ln>
           <a:extLst>
             <a:ext uri="{C572A759-6A51-4108-AA02-DFA0A04FC94B}">
-              <ma14:wrappingTextBoxFlag xmlns="" xmlns:m="http://schemas.openxmlformats.org/officeDocument/2006/math" xmlns:a14="http://schemas.microsoft.com/office/drawing/2010/main" xmlns:ma14="http://schemas.microsoft.com/office/mac/drawingml/2011/main" val="1"/>
+              <ma14:wrappingTextBoxFlag xmlns:ma14="http://schemas.microsoft.com/office/mac/drawingml/2011/main" xmlns:a14="http://schemas.microsoft.com/office/drawing/2010/main" xmlns:m="http://schemas.openxmlformats.org/officeDocument/2006/math" xmlns="" val="1"/>
             </a:ext>
           </a:extLst>
         </p:spPr>
@@ -4673,7 +4640,7 @@
           </a:ln>
           <a:extLst>
             <a:ext uri="{C572A759-6A51-4108-AA02-DFA0A04FC94B}">
-              <ma14:wrappingTextBoxFlag xmlns="" xmlns:m="http://schemas.openxmlformats.org/officeDocument/2006/math" xmlns:a14="http://schemas.microsoft.com/office/drawing/2010/main" xmlns:ma14="http://schemas.microsoft.com/office/mac/drawingml/2011/main" val="1"/>
+              <ma14:wrappingTextBoxFlag xmlns:ma14="http://schemas.microsoft.com/office/mac/drawingml/2011/main" xmlns:a14="http://schemas.microsoft.com/office/drawing/2010/main" xmlns:m="http://schemas.openxmlformats.org/officeDocument/2006/math" xmlns="" val="1"/>
             </a:ext>
           </a:extLst>
         </p:spPr>
@@ -4694,197 +4661,6 @@
             <a:r>
               <a:rPr lang="en-US" dirty="0"/>
               <a:t>I. Weighted Voting</a:t>
-            </a:r>
-            <a:endParaRPr dirty="0"/>
-          </a:p>
-        </p:txBody>
-      </p:sp>
-      <p:sp>
-        <p:nvSpPr>
-          <p:cNvPr id="261" name="Rectangle 116"/>
-          <p:cNvSpPr txBox="1"/>
-          <p:nvPr/>
-        </p:nvSpPr>
-        <p:spPr>
-          <a:xfrm>
-            <a:off x="13775704" y="9053106"/>
-            <a:ext cx="4707325" cy="3713837"/>
-          </a:xfrm>
-          <a:prstGeom prst="rect">
-            <a:avLst/>
-          </a:prstGeom>
-          <a:ln w="3175">
-            <a:miter lim="400000"/>
-          </a:ln>
-          <a:extLst>
-            <a:ext uri="{C572A759-6A51-4108-AA02-DFA0A04FC94B}">
-              <ma14:wrappingTextBoxFlag xmlns="" xmlns:m="http://schemas.openxmlformats.org/officeDocument/2006/math" xmlns:a14="http://schemas.microsoft.com/office/drawing/2010/main" xmlns:ma14="http://schemas.microsoft.com/office/mac/drawingml/2011/main" val="1"/>
-            </a:ext>
-          </a:extLst>
-        </p:spPr>
-        <p:txBody>
-          <a:bodyPr lIns="45719" rIns="45719" anchor="ctr">
-            <a:spAutoFit/>
-          </a:bodyPr>
-          <a:lstStyle/>
-          <a:p>
-            <a:pPr defTabSz="3511296">
-              <a:spcBef>
-                <a:spcPts val="400"/>
-              </a:spcBef>
-              <a:buSzPct val="100000"/>
-              <a:defRPr sz="2600">
-                <a:latin typeface="Roboto Thin"/>
-                <a:ea typeface="Roboto Thin"/>
-                <a:cs typeface="Roboto Thin"/>
-                <a:sym typeface="Roboto Thin"/>
-              </a:defRPr>
-            </a:pPr>
-            <a:r>
-              <a:rPr lang="en-US" sz="3000" u="sng" dirty="0">
-                <a:latin typeface="Roboto" panose="02000000000000000000" pitchFamily="2" charset="0"/>
-                <a:ea typeface="Roboto" panose="02000000000000000000" pitchFamily="2" charset="0"/>
-              </a:rPr>
-              <a:t>Notable Selected Genes:</a:t>
-            </a:r>
-          </a:p>
-          <a:p>
-            <a:pPr marL="347578" indent="-347578" defTabSz="3511296">
-              <a:spcBef>
-                <a:spcPts val="400"/>
-              </a:spcBef>
-              <a:buSzPct val="100000"/>
-              <a:buAutoNum type="arabicPeriod"/>
-              <a:defRPr sz="2600">
-                <a:latin typeface="Roboto Thin"/>
-                <a:ea typeface="Roboto Thin"/>
-                <a:cs typeface="Roboto Thin"/>
-                <a:sym typeface="Roboto Thin"/>
-              </a:defRPr>
-            </a:pPr>
-            <a:r>
-              <a:rPr lang="en-US" dirty="0"/>
-              <a:t>List Placeholder</a:t>
-            </a:r>
-            <a:r>
-              <a:rPr dirty="0"/>
-              <a:t> </a:t>
-            </a:r>
-          </a:p>
-          <a:p>
-            <a:pPr marL="347578" indent="-347578" defTabSz="3511296">
-              <a:spcBef>
-                <a:spcPts val="400"/>
-              </a:spcBef>
-              <a:buSzPct val="100000"/>
-              <a:buAutoNum type="arabicPeriod"/>
-              <a:defRPr sz="2600">
-                <a:latin typeface="Roboto Thin"/>
-                <a:ea typeface="Roboto Thin"/>
-                <a:cs typeface="Roboto Thin"/>
-                <a:sym typeface="Roboto Thin"/>
-              </a:defRPr>
-            </a:pPr>
-            <a:r>
-              <a:rPr lang="en-US" dirty="0"/>
-              <a:t>For lists/bullet points</a:t>
-            </a:r>
-            <a:endParaRPr dirty="0"/>
-          </a:p>
-          <a:p>
-            <a:pPr marL="347578" indent="-347578" defTabSz="3511296">
-              <a:spcBef>
-                <a:spcPts val="400"/>
-              </a:spcBef>
-              <a:buSzPct val="100000"/>
-              <a:buAutoNum type="arabicPeriod"/>
-              <a:defRPr sz="2600">
-                <a:latin typeface="Roboto Thin"/>
-                <a:ea typeface="Roboto Thin"/>
-                <a:cs typeface="Roboto Thin"/>
-                <a:sym typeface="Roboto Thin"/>
-              </a:defRPr>
-            </a:pPr>
-            <a:r>
-              <a:rPr lang="en-US" dirty="0"/>
-              <a:t>H</a:t>
-            </a:r>
-          </a:p>
-          <a:p>
-            <a:pPr marL="347578" indent="-347578" defTabSz="3511296">
-              <a:spcBef>
-                <a:spcPts val="400"/>
-              </a:spcBef>
-              <a:buSzPct val="100000"/>
-              <a:buAutoNum type="arabicPeriod"/>
-              <a:defRPr sz="2600">
-                <a:latin typeface="Roboto Thin"/>
-                <a:ea typeface="Roboto Thin"/>
-                <a:cs typeface="Roboto Thin"/>
-                <a:sym typeface="Roboto Thin"/>
-              </a:defRPr>
-            </a:pPr>
-            <a:r>
-              <a:rPr lang="en-US" dirty="0"/>
-              <a:t>E</a:t>
-            </a:r>
-            <a:endParaRPr dirty="0"/>
-          </a:p>
-          <a:p>
-            <a:pPr marL="347578" indent="-347578" defTabSz="3511296">
-              <a:spcBef>
-                <a:spcPts val="400"/>
-              </a:spcBef>
-              <a:buSzPct val="100000"/>
-              <a:buAutoNum type="arabicPeriod"/>
-              <a:defRPr sz="2600">
-                <a:latin typeface="Roboto Thin"/>
-                <a:ea typeface="Roboto Thin"/>
-                <a:cs typeface="Roboto Thin"/>
-                <a:sym typeface="Roboto Thin"/>
-              </a:defRPr>
-            </a:pPr>
-            <a:r>
-              <a:rPr lang="en-US" dirty="0"/>
-              <a:t>L</a:t>
-            </a:r>
-          </a:p>
-          <a:p>
-            <a:pPr marL="347578" indent="-347578" defTabSz="3511296">
-              <a:spcBef>
-                <a:spcPts val="400"/>
-              </a:spcBef>
-              <a:buSzPct val="100000"/>
-              <a:buAutoNum type="arabicPeriod"/>
-              <a:defRPr sz="2600">
-                <a:latin typeface="Roboto Thin"/>
-                <a:ea typeface="Roboto Thin"/>
-                <a:cs typeface="Roboto Thin"/>
-                <a:sym typeface="Roboto Thin"/>
-              </a:defRPr>
-            </a:pPr>
-            <a:r>
-              <a:rPr lang="en-US" dirty="0"/>
-              <a:t>L</a:t>
-            </a:r>
-          </a:p>
-          <a:p>
-            <a:pPr marL="347578" indent="-347578" defTabSz="3511296">
-              <a:spcBef>
-                <a:spcPts val="400"/>
-              </a:spcBef>
-              <a:buSzPct val="100000"/>
-              <a:buAutoNum type="arabicPeriod"/>
-              <a:defRPr sz="2600">
-                <a:latin typeface="Roboto Thin"/>
-                <a:ea typeface="Roboto Thin"/>
-                <a:cs typeface="Roboto Thin"/>
-                <a:sym typeface="Roboto Thin"/>
-              </a:defRPr>
-            </a:pPr>
-            <a:r>
-              <a:rPr lang="en-US" dirty="0"/>
-              <a:t>O</a:t>
             </a:r>
             <a:endParaRPr dirty="0"/>
           </a:p>
@@ -4920,7 +4696,7 @@
           </a:ln>
           <a:extLst>
             <a:ext uri="{C572A759-6A51-4108-AA02-DFA0A04FC94B}">
-              <ma14:wrappingTextBoxFlag xmlns="" xmlns:m="http://schemas.openxmlformats.org/officeDocument/2006/math" xmlns:a14="http://schemas.microsoft.com/office/drawing/2010/main" xmlns:ma14="http://schemas.microsoft.com/office/mac/drawingml/2011/main" val="1"/>
+              <ma14:wrappingTextBoxFlag xmlns:ma14="http://schemas.microsoft.com/office/mac/drawingml/2011/main" xmlns:a14="http://schemas.microsoft.com/office/drawing/2010/main" xmlns:m="http://schemas.openxmlformats.org/officeDocument/2006/math" xmlns="" val="1"/>
             </a:ext>
           </a:extLst>
         </p:spPr>
@@ -4962,7 +4738,7 @@
         </p:nvSpPr>
         <p:spPr>
           <a:xfrm>
-            <a:off x="13208000" y="14655333"/>
+            <a:off x="13208000" y="14895963"/>
             <a:ext cx="11684000" cy="1143000"/>
           </a:xfrm>
           <a:prstGeom prst="rect">
@@ -4978,7 +4754,7 @@
           </a:ln>
           <a:extLst>
             <a:ext uri="{C572A759-6A51-4108-AA02-DFA0A04FC94B}">
-              <ma14:wrappingTextBoxFlag xmlns="" xmlns:m="http://schemas.openxmlformats.org/officeDocument/2006/math" xmlns:a14="http://schemas.microsoft.com/office/drawing/2010/main" xmlns:ma14="http://schemas.microsoft.com/office/mac/drawingml/2011/main" val="1"/>
+              <ma14:wrappingTextBoxFlag xmlns:ma14="http://schemas.microsoft.com/office/mac/drawingml/2011/main" xmlns:a14="http://schemas.microsoft.com/office/drawing/2010/main" xmlns:m="http://schemas.openxmlformats.org/officeDocument/2006/math" xmlns="" val="1"/>
             </a:ext>
           </a:extLst>
         </p:spPr>
@@ -5031,7 +4807,7 @@
           </a:ln>
           <a:extLst>
             <a:ext uri="{C572A759-6A51-4108-AA02-DFA0A04FC94B}">
-              <ma14:wrappingTextBoxFlag xmlns="" xmlns:m="http://schemas.openxmlformats.org/officeDocument/2006/math" xmlns:a14="http://schemas.microsoft.com/office/drawing/2010/main" xmlns:ma14="http://schemas.microsoft.com/office/mac/drawingml/2011/main" val="1"/>
+              <ma14:wrappingTextBoxFlag xmlns:ma14="http://schemas.microsoft.com/office/mac/drawingml/2011/main" xmlns:a14="http://schemas.microsoft.com/office/drawing/2010/main" xmlns:m="http://schemas.openxmlformats.org/officeDocument/2006/math" xmlns="" val="1"/>
             </a:ext>
           </a:extLst>
         </p:spPr>
@@ -5156,7 +4932,7 @@
           </a:ln>
           <a:extLst>
             <a:ext uri="{C572A759-6A51-4108-AA02-DFA0A04FC94B}">
-              <ma14:wrappingTextBoxFlag xmlns="" xmlns:m="http://schemas.openxmlformats.org/officeDocument/2006/math" xmlns:a14="http://schemas.microsoft.com/office/drawing/2010/main" xmlns:ma14="http://schemas.microsoft.com/office/mac/drawingml/2011/main" val="1"/>
+              <ma14:wrappingTextBoxFlag xmlns:ma14="http://schemas.microsoft.com/office/mac/drawingml/2011/main" xmlns:a14="http://schemas.microsoft.com/office/drawing/2010/main" xmlns:m="http://schemas.openxmlformats.org/officeDocument/2006/math" xmlns="" val="1"/>
             </a:ext>
           </a:extLst>
         </p:spPr>
@@ -5263,7 +5039,7 @@
           </a:ln>
           <a:extLst>
             <a:ext uri="{C572A759-6A51-4108-AA02-DFA0A04FC94B}">
-              <ma14:wrappingTextBoxFlag xmlns="" xmlns:m="http://schemas.openxmlformats.org/officeDocument/2006/math" xmlns:a14="http://schemas.microsoft.com/office/drawing/2010/main" xmlns:ma14="http://schemas.microsoft.com/office/mac/drawingml/2011/main" val="1"/>
+              <ma14:wrappingTextBoxFlag xmlns:ma14="http://schemas.microsoft.com/office/mac/drawingml/2011/main" xmlns:a14="http://schemas.microsoft.com/office/drawing/2010/main" xmlns:m="http://schemas.openxmlformats.org/officeDocument/2006/math" xmlns="" val="1"/>
             </a:ext>
           </a:extLst>
         </p:spPr>
@@ -5330,7 +5106,7 @@
           </a:ln>
           <a:extLst>
             <a:ext uri="{C572A759-6A51-4108-AA02-DFA0A04FC94B}">
-              <ma14:wrappingTextBoxFlag xmlns="" xmlns:m="http://schemas.openxmlformats.org/officeDocument/2006/math" xmlns:a14="http://schemas.microsoft.com/office/drawing/2010/main" xmlns:ma14="http://schemas.microsoft.com/office/mac/drawingml/2011/main" val="1"/>
+              <ma14:wrappingTextBoxFlag xmlns:ma14="http://schemas.microsoft.com/office/mac/drawingml/2011/main" xmlns:a14="http://schemas.microsoft.com/office/drawing/2010/main" xmlns:m="http://schemas.openxmlformats.org/officeDocument/2006/math" xmlns="" val="1"/>
             </a:ext>
           </a:extLst>
         </p:spPr>
@@ -5397,7 +5173,7 @@
           </a:ln>
           <a:extLst>
             <a:ext uri="{C572A759-6A51-4108-AA02-DFA0A04FC94B}">
-              <ma14:wrappingTextBoxFlag xmlns="" xmlns:m="http://schemas.openxmlformats.org/officeDocument/2006/math" xmlns:a14="http://schemas.microsoft.com/office/drawing/2010/main" xmlns:ma14="http://schemas.microsoft.com/office/mac/drawingml/2011/main" val="1"/>
+              <ma14:wrappingTextBoxFlag xmlns:ma14="http://schemas.microsoft.com/office/mac/drawingml/2011/main" xmlns:a14="http://schemas.microsoft.com/office/drawing/2010/main" xmlns:m="http://schemas.openxmlformats.org/officeDocument/2006/math" xmlns="" val="1"/>
             </a:ext>
           </a:extLst>
         </p:spPr>
@@ -5464,7 +5240,7 @@
           </a:ln>
           <a:extLst>
             <a:ext uri="{C572A759-6A51-4108-AA02-DFA0A04FC94B}">
-              <ma14:wrappingTextBoxFlag xmlns="" xmlns:m="http://schemas.openxmlformats.org/officeDocument/2006/math" xmlns:a14="http://schemas.microsoft.com/office/drawing/2010/main" xmlns:ma14="http://schemas.microsoft.com/office/mac/drawingml/2011/main" val="1"/>
+              <ma14:wrappingTextBoxFlag xmlns:ma14="http://schemas.microsoft.com/office/mac/drawingml/2011/main" xmlns:a14="http://schemas.microsoft.com/office/drawing/2010/main" xmlns:m="http://schemas.openxmlformats.org/officeDocument/2006/math" xmlns="" val="1"/>
             </a:ext>
           </a:extLst>
         </p:spPr>
@@ -6120,7 +5896,7 @@
           </a:ln>
           <a:extLst>
             <a:ext uri="{C572A759-6A51-4108-AA02-DFA0A04FC94B}">
-              <ma14:wrappingTextBoxFlag xmlns="" xmlns:m="http://schemas.openxmlformats.org/officeDocument/2006/math" xmlns:a14="http://schemas.microsoft.com/office/drawing/2010/main" xmlns:ma14="http://schemas.microsoft.com/office/mac/drawingml/2011/main" val="1"/>
+              <ma14:wrappingTextBoxFlag xmlns:ma14="http://schemas.microsoft.com/office/mac/drawingml/2011/main" xmlns:a14="http://schemas.microsoft.com/office/drawing/2010/main" xmlns:m="http://schemas.openxmlformats.org/officeDocument/2006/math" xmlns="" val="1"/>
             </a:ext>
           </a:extLst>
         </p:spPr>
@@ -6507,7 +6283,7 @@
           </a:ln>
           <a:extLst>
             <a:ext uri="{C572A759-6A51-4108-AA02-DFA0A04FC94B}">
-              <ma14:wrappingTextBoxFlag xmlns="" xmlns:m="http://schemas.openxmlformats.org/officeDocument/2006/math" xmlns:a14="http://schemas.microsoft.com/office/drawing/2010/main" xmlns:ma14="http://schemas.microsoft.com/office/mac/drawingml/2011/main" val="1"/>
+              <ma14:wrappingTextBoxFlag xmlns:ma14="http://schemas.microsoft.com/office/mac/drawingml/2011/main" xmlns:a14="http://schemas.microsoft.com/office/drawing/2010/main" xmlns:m="http://schemas.openxmlformats.org/officeDocument/2006/math" xmlns="" val="1"/>
             </a:ext>
           </a:extLst>
         </p:spPr>
@@ -6567,7 +6343,7 @@
           </a:ln>
           <a:extLst>
             <a:ext uri="{C572A759-6A51-4108-AA02-DFA0A04FC94B}">
-              <ma14:wrappingTextBoxFlag xmlns="" xmlns:m="http://schemas.openxmlformats.org/officeDocument/2006/math" xmlns:a14="http://schemas.microsoft.com/office/drawing/2010/main" xmlns:ma14="http://schemas.microsoft.com/office/mac/drawingml/2011/main" val="1"/>
+              <ma14:wrappingTextBoxFlag xmlns:ma14="http://schemas.microsoft.com/office/mac/drawingml/2011/main" xmlns:a14="http://schemas.microsoft.com/office/drawing/2010/main" xmlns:m="http://schemas.openxmlformats.org/officeDocument/2006/math" xmlns="" val="1"/>
             </a:ext>
           </a:extLst>
         </p:spPr>
@@ -6627,7 +6403,7 @@
           </a:ln>
           <a:extLst>
             <a:ext uri="{C572A759-6A51-4108-AA02-DFA0A04FC94B}">
-              <ma14:wrappingTextBoxFlag xmlns="" xmlns:m="http://schemas.openxmlformats.org/officeDocument/2006/math" xmlns:a14="http://schemas.microsoft.com/office/drawing/2010/main" xmlns:ma14="http://schemas.microsoft.com/office/mac/drawingml/2011/main" val="1"/>
+              <ma14:wrappingTextBoxFlag xmlns:ma14="http://schemas.microsoft.com/office/mac/drawingml/2011/main" xmlns:a14="http://schemas.microsoft.com/office/drawing/2010/main" xmlns:m="http://schemas.openxmlformats.org/officeDocument/2006/math" xmlns="" val="1"/>
             </a:ext>
           </a:extLst>
         </p:spPr>
@@ -6690,7 +6466,7 @@
           </a:ln>
           <a:extLst>
             <a:ext uri="{C572A759-6A51-4108-AA02-DFA0A04FC94B}">
-              <ma14:wrappingTextBoxFlag xmlns="" xmlns:m="http://schemas.openxmlformats.org/officeDocument/2006/math" xmlns:a14="http://schemas.microsoft.com/office/drawing/2010/main" xmlns:ma14="http://schemas.microsoft.com/office/mac/drawingml/2011/main" val="1"/>
+              <ma14:wrappingTextBoxFlag xmlns:ma14="http://schemas.microsoft.com/office/mac/drawingml/2011/main" xmlns:a14="http://schemas.microsoft.com/office/drawing/2010/main" xmlns:m="http://schemas.openxmlformats.org/officeDocument/2006/math" xmlns="" val="1"/>
             </a:ext>
           </a:extLst>
         </p:spPr>
@@ -6847,7 +6623,7 @@
           </a:ln>
           <a:extLst>
             <a:ext uri="{C572A759-6A51-4108-AA02-DFA0A04FC94B}">
-              <ma14:wrappingTextBoxFlag xmlns="" xmlns:m="http://schemas.openxmlformats.org/officeDocument/2006/math" xmlns:a14="http://schemas.microsoft.com/office/drawing/2010/main" xmlns:ma14="http://schemas.microsoft.com/office/mac/drawingml/2011/main" val="1"/>
+              <ma14:wrappingTextBoxFlag xmlns:ma14="http://schemas.microsoft.com/office/mac/drawingml/2011/main" xmlns:a14="http://schemas.microsoft.com/office/drawing/2010/main" xmlns:m="http://schemas.openxmlformats.org/officeDocument/2006/math" xmlns="" val="1"/>
             </a:ext>
           </a:extLst>
         </p:spPr>
@@ -6898,7 +6674,7 @@
           </a:ln>
           <a:extLst>
             <a:ext uri="{C572A759-6A51-4108-AA02-DFA0A04FC94B}">
-              <ma14:wrappingTextBoxFlag xmlns="" xmlns:m="http://schemas.openxmlformats.org/officeDocument/2006/math" xmlns:a14="http://schemas.microsoft.com/office/drawing/2010/main" xmlns:ma14="http://schemas.microsoft.com/office/mac/drawingml/2011/main" val="1"/>
+              <ma14:wrappingTextBoxFlag xmlns:ma14="http://schemas.microsoft.com/office/mac/drawingml/2011/main" xmlns:a14="http://schemas.microsoft.com/office/drawing/2010/main" xmlns:m="http://schemas.openxmlformats.org/officeDocument/2006/math" xmlns="" val="1"/>
             </a:ext>
           </a:extLst>
         </p:spPr>
@@ -6949,7 +6725,7 @@
           </a:ln>
           <a:extLst>
             <a:ext uri="{C572A759-6A51-4108-AA02-DFA0A04FC94B}">
-              <ma14:wrappingTextBoxFlag xmlns="" xmlns:m="http://schemas.openxmlformats.org/officeDocument/2006/math" xmlns:a14="http://schemas.microsoft.com/office/drawing/2010/main" xmlns:ma14="http://schemas.microsoft.com/office/mac/drawingml/2011/main" val="1"/>
+              <ma14:wrappingTextBoxFlag xmlns:ma14="http://schemas.microsoft.com/office/mac/drawingml/2011/main" xmlns:a14="http://schemas.microsoft.com/office/drawing/2010/main" xmlns:m="http://schemas.openxmlformats.org/officeDocument/2006/math" xmlns="" val="1"/>
             </a:ext>
           </a:extLst>
         </p:spPr>
@@ -7218,8 +6994,8 @@
         </p:nvSpPr>
         <p:spPr>
           <a:xfrm>
-            <a:off x="13538631" y="13697621"/>
-            <a:ext cx="11447362" cy="715402"/>
+            <a:off x="13281184" y="13677955"/>
+            <a:ext cx="11476889" cy="1084111"/>
           </a:xfrm>
           <a:prstGeom prst="rect">
             <a:avLst/>
@@ -7268,7 +7044,18 @@
                 <a:ea typeface="Roboto" charset="0"/>
                 <a:cs typeface="Roboto" charset="0"/>
               </a:rPr>
-              <a:t>AEGIS Study Team, </a:t>
+              <a:t>Johnston, P.A. and Grandis, J.R. </a:t>
+            </a:r>
+            <a:r>
+              <a:rPr lang="en-US" sz="1600" i="1" dirty="0" err="1">
+                <a:solidFill>
+                  <a:schemeClr val="tx1"/>
+                </a:solidFill>
+                <a:latin typeface="Roboto" charset="0"/>
+                <a:ea typeface="Roboto" charset="0"/>
+                <a:cs typeface="Roboto" charset="0"/>
+              </a:rPr>
+              <a:t>Mol</a:t>
             </a:r>
             <a:r>
               <a:rPr lang="en-US" sz="1600" i="1" dirty="0">
@@ -7279,7 +7066,29 @@
                 <a:ea typeface="Roboto" charset="0"/>
                 <a:cs typeface="Roboto" charset="0"/>
               </a:rPr>
-              <a:t>J Natl Cancer Inst,</a:t>
+              <a:t> </a:t>
+            </a:r>
+            <a:r>
+              <a:rPr lang="en-US" sz="1600" i="1" dirty="0" err="1">
+                <a:solidFill>
+                  <a:schemeClr val="tx1"/>
+                </a:solidFill>
+                <a:latin typeface="Roboto" charset="0"/>
+                <a:ea typeface="Roboto" charset="0"/>
+                <a:cs typeface="Roboto" charset="0"/>
+              </a:rPr>
+              <a:t>Interv</a:t>
+            </a:r>
+            <a:r>
+              <a:rPr lang="en-US" sz="1600" i="1" dirty="0">
+                <a:solidFill>
+                  <a:schemeClr val="tx1"/>
+                </a:solidFill>
+                <a:latin typeface="Roboto" charset="0"/>
+                <a:ea typeface="Roboto" charset="0"/>
+                <a:cs typeface="Roboto" charset="0"/>
+              </a:rPr>
+              <a:t>,</a:t>
             </a:r>
             <a:r>
               <a:rPr lang="en-US" sz="1600" dirty="0">
@@ -7290,7 +7099,7 @@
                 <a:ea typeface="Roboto" charset="0"/>
                 <a:cs typeface="Roboto" charset="0"/>
               </a:rPr>
-              <a:t> 2017, </a:t>
+              <a:t> 2011, </a:t>
             </a:r>
             <a:r>
               <a:rPr lang="en-US" sz="1600" b="1" dirty="0">
@@ -7301,7 +7110,7 @@
                 <a:ea typeface="Roboto" charset="0"/>
                 <a:cs typeface="Roboto" charset="0"/>
               </a:rPr>
-              <a:t>109 </a:t>
+              <a:t>11 </a:t>
             </a:r>
             <a:r>
               <a:rPr lang="en-US" sz="1600" dirty="0">
@@ -7312,29 +7121,7 @@
                 <a:ea typeface="Roboto" charset="0"/>
                 <a:cs typeface="Roboto" charset="0"/>
               </a:rPr>
-              <a:t>(7), DOI: 10.1093/</a:t>
-            </a:r>
-            <a:r>
-              <a:rPr lang="en-US" sz="1600" dirty="0" err="1">
-                <a:solidFill>
-                  <a:schemeClr val="tx1"/>
-                </a:solidFill>
-                <a:latin typeface="Roboto" charset="0"/>
-                <a:ea typeface="Roboto" charset="0"/>
-                <a:cs typeface="Roboto" charset="0"/>
-              </a:rPr>
-              <a:t>jnci</a:t>
-            </a:r>
-            <a:r>
-              <a:rPr lang="en-US" sz="1600" dirty="0">
-                <a:solidFill>
-                  <a:schemeClr val="tx1"/>
-                </a:solidFill>
-                <a:latin typeface="Roboto" charset="0"/>
-                <a:ea typeface="Roboto" charset="0"/>
-                <a:cs typeface="Roboto" charset="0"/>
-              </a:rPr>
-              <a:t>/djw327</a:t>
+              <a:t>(1), 18-26. DOI: 10.1124/mi.11.1.4</a:t>
             </a:r>
           </a:p>
           <a:p>
@@ -7358,28 +7145,52 @@
                 <a:ea typeface="Roboto" charset="0"/>
                 <a:cs typeface="Roboto" charset="0"/>
               </a:rPr>
-              <a:t>National Center for Biotechnology Information, </a:t>
-            </a:r>
-            <a:r>
-              <a:rPr lang="en-US" sz="1600" u="sng" dirty="0">
+              <a:t>Wang, X. et al. </a:t>
+            </a:r>
+            <a:r>
+              <a:rPr lang="en-US" sz="1600" i="1" dirty="0">
                 <a:solidFill>
                   <a:schemeClr val="tx1"/>
                 </a:solidFill>
                 <a:latin typeface="Roboto" charset="0"/>
                 <a:ea typeface="Roboto" charset="0"/>
                 <a:cs typeface="Roboto" charset="0"/>
-                <a:hlinkClick r:id="rId2"/>
               </a:rPr>
-              <a:t>https://www.ncbi.nlm.nih.gov/gds</a:t>
-            </a:r>
-            <a:endParaRPr lang="en-US" sz="1600" u="sng" dirty="0">
-              <a:solidFill>
-                <a:schemeClr val="tx1"/>
-              </a:solidFill>
-              <a:latin typeface="Roboto" charset="0"/>
-              <a:ea typeface="Roboto" charset="0"/>
-              <a:cs typeface="Roboto" charset="0"/>
-            </a:endParaRPr>
+              <a:t>BMC Cancer</a:t>
+            </a:r>
+            <a:r>
+              <a:rPr lang="en-US" sz="1600" dirty="0">
+                <a:solidFill>
+                  <a:schemeClr val="tx1"/>
+                </a:solidFill>
+                <a:latin typeface="Roboto" charset="0"/>
+                <a:ea typeface="Roboto" charset="0"/>
+                <a:cs typeface="Roboto" charset="0"/>
+              </a:rPr>
+              <a:t>, 2016, </a:t>
+            </a:r>
+            <a:r>
+              <a:rPr lang="en-US" sz="1600" b="1" dirty="0">
+                <a:solidFill>
+                  <a:schemeClr val="tx1"/>
+                </a:solidFill>
+                <a:latin typeface="Roboto" charset="0"/>
+                <a:ea typeface="Roboto" charset="0"/>
+                <a:cs typeface="Roboto" charset="0"/>
+              </a:rPr>
+              <a:t>16 </a:t>
+            </a:r>
+            <a:r>
+              <a:rPr lang="en-US" sz="1600" dirty="0">
+                <a:solidFill>
+                  <a:schemeClr val="tx1"/>
+                </a:solidFill>
+                <a:latin typeface="Roboto" charset="0"/>
+                <a:ea typeface="Roboto" charset="0"/>
+                <a:cs typeface="Roboto" charset="0"/>
+              </a:rPr>
+              <a:t>(383). DOI: 10.1186/s12885-016-2460-5</a:t>
+            </a:r>
           </a:p>
           <a:p>
             <a:r>
@@ -7402,10 +7213,10 @@
                 <a:ea typeface="Roboto" charset="0"/>
                 <a:cs typeface="Roboto" charset="0"/>
               </a:rPr>
-              <a:t>Affymetrix, </a:t>
-            </a:r>
-            <a:r>
-              <a:rPr lang="en-US" sz="1600" u="sng" dirty="0">
+              <a:t>Zhang, F. et al. </a:t>
+            </a:r>
+            <a:r>
+              <a:rPr lang="en-US" sz="1600" i="1" dirty="0">
                 <a:solidFill>
                   <a:schemeClr val="tx1"/>
                 </a:solidFill>
@@ -7413,10 +7224,10 @@
                 <a:ea typeface="Roboto" charset="0"/>
                 <a:cs typeface="Roboto" charset="0"/>
               </a:rPr>
-              <a:t>https://</a:t>
-            </a:r>
-            <a:r>
-              <a:rPr lang="en-US" sz="1600" u="sng" dirty="0" err="1">
+              <a:t>Cell </a:t>
+            </a:r>
+            <a:r>
+              <a:rPr lang="en-US" sz="1600" i="1" dirty="0" err="1">
                 <a:solidFill>
                   <a:schemeClr val="tx1"/>
                 </a:solidFill>
@@ -7424,10 +7235,10 @@
                 <a:ea typeface="Roboto" charset="0"/>
                 <a:cs typeface="Roboto" charset="0"/>
               </a:rPr>
-              <a:t>www.affymetrix.com</a:t>
-            </a:r>
-            <a:r>
-              <a:rPr lang="en-US" sz="1600" u="sng" dirty="0">
+              <a:t>Prolif</a:t>
+            </a:r>
+            <a:r>
+              <a:rPr lang="en-US" sz="1600" dirty="0">
                 <a:solidFill>
                   <a:schemeClr val="tx1"/>
                 </a:solidFill>
@@ -7435,10 +7246,10 @@
                 <a:ea typeface="Roboto" charset="0"/>
                 <a:cs typeface="Roboto" charset="0"/>
               </a:rPr>
-              <a:t>/analysis/downloads/na36/</a:t>
-            </a:r>
-            <a:r>
-              <a:rPr lang="en-US" sz="1600" u="sng" dirty="0" err="1">
+              <a:t>, 2018, </a:t>
+            </a:r>
+            <a:r>
+              <a:rPr lang="en-US" sz="1600" b="1" dirty="0">
                 <a:solidFill>
                   <a:schemeClr val="tx1"/>
                 </a:solidFill>
@@ -7446,10 +7257,10 @@
                 <a:ea typeface="Roboto" charset="0"/>
                 <a:cs typeface="Roboto" charset="0"/>
               </a:rPr>
-              <a:t>wtgene</a:t>
-            </a:r>
-            <a:r>
-              <a:rPr lang="en-US" sz="1600" u="sng" dirty="0">
+              <a:t>51</a:t>
+            </a:r>
+            <a:r>
+              <a:rPr lang="en-US" sz="1600" dirty="0">
                 <a:solidFill>
                   <a:schemeClr val="tx1"/>
                 </a:solidFill>
@@ -7457,8 +7268,188 @@
                 <a:ea typeface="Roboto" charset="0"/>
                 <a:cs typeface="Roboto" charset="0"/>
               </a:rPr>
-              <a:t>/</a:t>
-            </a:r>
+              <a:t> (1). DOI: 10.1111/cpr.12397</a:t>
+            </a:r>
+          </a:p>
+          <a:p>
+            <a:r>
+              <a:rPr lang="en-US" sz="1600" baseline="30000" dirty="0">
+                <a:solidFill>
+                  <a:schemeClr val="tx1"/>
+                </a:solidFill>
+                <a:latin typeface="Roboto" charset="0"/>
+                <a:ea typeface="Roboto" charset="0"/>
+                <a:cs typeface="Roboto" charset="0"/>
+              </a:rPr>
+              <a:t>[4] </a:t>
+            </a:r>
+            <a:r>
+              <a:rPr lang="en-US" sz="1600" dirty="0">
+                <a:solidFill>
+                  <a:schemeClr val="tx1"/>
+                </a:solidFill>
+                <a:latin typeface="Roboto" charset="0"/>
+                <a:ea typeface="Roboto" charset="0"/>
+                <a:cs typeface="Roboto" charset="0"/>
+              </a:rPr>
+              <a:t>Moldovan, G.-L., </a:t>
+            </a:r>
+            <a:r>
+              <a:rPr lang="en-US" sz="1600" dirty="0" err="1">
+                <a:solidFill>
+                  <a:schemeClr val="tx1"/>
+                </a:solidFill>
+                <a:latin typeface="Roboto" charset="0"/>
+                <a:ea typeface="Roboto" charset="0"/>
+                <a:cs typeface="Roboto" charset="0"/>
+              </a:rPr>
+              <a:t>D’andrea</a:t>
+            </a:r>
+            <a:r>
+              <a:rPr lang="en-US" sz="1600" dirty="0">
+                <a:solidFill>
+                  <a:schemeClr val="tx1"/>
+                </a:solidFill>
+                <a:latin typeface="Roboto" charset="0"/>
+                <a:ea typeface="Roboto" charset="0"/>
+                <a:cs typeface="Roboto" charset="0"/>
+              </a:rPr>
+              <a:t>, A. D. </a:t>
+            </a:r>
+            <a:r>
+              <a:rPr lang="en-US" sz="1600" i="1" dirty="0">
+                <a:solidFill>
+                  <a:schemeClr val="tx1"/>
+                </a:solidFill>
+                <a:latin typeface="Roboto" charset="0"/>
+                <a:ea typeface="Roboto" charset="0"/>
+                <a:cs typeface="Roboto" charset="0"/>
+              </a:rPr>
+              <a:t>Annual Review of Genetics</a:t>
+            </a:r>
+            <a:r>
+              <a:rPr lang="en-US" sz="1600" dirty="0">
+                <a:solidFill>
+                  <a:schemeClr val="tx1"/>
+                </a:solidFill>
+                <a:latin typeface="Roboto" charset="0"/>
+                <a:ea typeface="Roboto" charset="0"/>
+                <a:cs typeface="Roboto" charset="0"/>
+              </a:rPr>
+              <a:t>, 2009, </a:t>
+            </a:r>
+            <a:r>
+              <a:rPr lang="en-US" sz="1600" b="1" dirty="0">
+                <a:solidFill>
+                  <a:schemeClr val="tx1"/>
+                </a:solidFill>
+                <a:latin typeface="Roboto" charset="0"/>
+                <a:ea typeface="Roboto" charset="0"/>
+                <a:cs typeface="Roboto" charset="0"/>
+              </a:rPr>
+              <a:t>43</a:t>
+            </a:r>
+            <a:r>
+              <a:rPr lang="en-US" sz="1600" dirty="0">
+                <a:solidFill>
+                  <a:schemeClr val="tx1"/>
+                </a:solidFill>
+                <a:latin typeface="Roboto" charset="0"/>
+                <a:ea typeface="Roboto" charset="0"/>
+                <a:cs typeface="Roboto" charset="0"/>
+              </a:rPr>
+              <a:t>, 223-249, DOI: 10.1146/annurev-genet-102108-134222</a:t>
+            </a:r>
+            <a:endParaRPr lang="en-US" sz="1600" u="sng" dirty="0">
+              <a:solidFill>
+                <a:schemeClr val="tx1"/>
+              </a:solidFill>
+              <a:latin typeface="Roboto" charset="0"/>
+              <a:ea typeface="Roboto" charset="0"/>
+              <a:cs typeface="Roboto" charset="0"/>
+            </a:endParaRPr>
+          </a:p>
+        </p:txBody>
+      </p:sp>
+      <p:pic>
+        <p:nvPicPr>
+          <p:cNvPr id="4" name="Picture 3">
+            <a:extLst>
+              <a:ext uri="{FF2B5EF4-FFF2-40B4-BE49-F238E27FC236}">
+                <a16:creationId xmlns:a16="http://schemas.microsoft.com/office/drawing/2014/main" id="{1A65858B-A797-0542-AB61-D8737288F171}"/>
+              </a:ext>
+            </a:extLst>
+          </p:cNvPr>
+          <p:cNvPicPr>
+            <a:picLocks noChangeAspect="1"/>
+          </p:cNvPicPr>
+          <p:nvPr/>
+        </p:nvPicPr>
+        <p:blipFill>
+          <a:blip r:embed="rId4"/>
+          <a:stretch>
+            <a:fillRect/>
+          </a:stretch>
+        </p:blipFill>
+        <p:spPr>
+          <a:xfrm>
+            <a:off x="13462000" y="11506127"/>
+            <a:ext cx="11153494" cy="1586591"/>
+          </a:xfrm>
+          <a:prstGeom prst="rect">
+            <a:avLst/>
+          </a:prstGeom>
+        </p:spPr>
+      </p:pic>
+      <p:sp>
+        <p:nvSpPr>
+          <p:cNvPr id="64" name="Rectangle 116">
+            <a:extLst>
+              <a:ext uri="{FF2B5EF4-FFF2-40B4-BE49-F238E27FC236}">
+                <a16:creationId xmlns:a16="http://schemas.microsoft.com/office/drawing/2014/main" id="{E5C2D423-B2FA-AE42-953B-44118E9C03C3}"/>
+              </a:ext>
+            </a:extLst>
+          </p:cNvPr>
+          <p:cNvSpPr txBox="1"/>
+          <p:nvPr/>
+        </p:nvSpPr>
+        <p:spPr>
+          <a:xfrm>
+            <a:off x="16495082" y="13052186"/>
+            <a:ext cx="5019567" cy="461665"/>
+          </a:xfrm>
+          <a:prstGeom prst="rect">
+            <a:avLst/>
+          </a:prstGeom>
+          <a:ln w="3175">
+            <a:miter lim="400000"/>
+          </a:ln>
+          <a:extLst>
+            <a:ext uri="{C572A759-6A51-4108-AA02-DFA0A04FC94B}">
+              <ma14:wrappingTextBoxFlag xmlns:ma14="http://schemas.microsoft.com/office/mac/drawingml/2011/main" xmlns:a14="http://schemas.microsoft.com/office/drawing/2010/main" xmlns:m="http://schemas.openxmlformats.org/officeDocument/2006/math" xmlns="" val="1"/>
+            </a:ext>
+          </a:extLst>
+        </p:spPr>
+        <p:txBody>
+          <a:bodyPr wrap="square" lIns="45719" rIns="45719" anchor="ctr">
+            <a:spAutoFit/>
+          </a:bodyPr>
+          <a:lstStyle>
+            <a:lvl1pPr algn="ctr" defTabSz="3511296">
+              <a:defRPr sz="3600">
+                <a:latin typeface="Roboto Regular"/>
+                <a:ea typeface="Roboto Regular"/>
+                <a:cs typeface="Roboto Regular"/>
+                <a:sym typeface="Roboto Regular"/>
+              </a:defRPr>
+            </a:lvl1pPr>
+          </a:lstStyle>
+          <a:p>
+            <a:r>
+              <a:rPr lang="en-US" sz="2400" b="1" dirty="0"/>
+              <a:t>Table 1 – Notable Genes in Predictor</a:t>
+            </a:r>
+            <a:endParaRPr sz="2400" b="1" dirty="0"/>
           </a:p>
         </p:txBody>
       </p:sp>

</xml_diff>